<commit_message>
Update What’s New in .NET Core 3.0.pptx
</commit_message>
<xml_diff>
--- a/What’s New in .NET Core 3.0.pptx
+++ b/What’s New in .NET Core 3.0.pptx
@@ -8701,15 +8701,7 @@
           <a:p>
             <a:r>
               <a:rPr lang="en-US" dirty="0"/>
-              <a:t>May want to show </a:t>
-            </a:r>
-            <a:r>
-              <a:rPr lang="en-US" dirty="0" err="1"/>
-              <a:t>DynamicProxies</a:t>
-            </a:r>
-            <a:r>
-              <a:rPr lang="en-US" dirty="0"/>
-              <a:t> now working under .NET Standard 2.1, also show </a:t>
+              <a:t>Show </a:t>
             </a:r>
             <a:r>
               <a:rPr lang="en-US" dirty="0" err="1"/>
@@ -8717,7 +8709,15 @@
             </a:r>
             <a:r>
               <a:rPr lang="en-US" dirty="0"/>
-              <a:t> and other new members.</a:t>
+              <a:t>, </a:t>
+            </a:r>
+            <a:r>
+              <a:rPr lang="en-US" dirty="0" err="1"/>
+              <a:t>IAsyncDisposable</a:t>
+            </a:r>
+            <a:r>
+              <a:rPr lang="en-US" dirty="0"/>
+              <a:t>, and other new members.</a:t>
             </a:r>
           </a:p>
           <a:p>
@@ -16852,7 +16852,22 @@
             </a:pPr>
             <a:r>
               <a:rPr lang="en-US" sz="3800" dirty="0"/>
-              <a:t>https://github.com/JasonBock/DynamicProxies</a:t>
+              <a:t>https://github.com/JasonBock/WhatsNewInNETCore3</a:t>
+            </a:r>
+          </a:p>
+          <a:p>
+            <a:pPr marL="68580" indent="0" algn="ctr">
+              <a:buNone/>
+            </a:pPr>
+            <a:endParaRPr lang="en-US" sz="3800" dirty="0"/>
+          </a:p>
+          <a:p>
+            <a:pPr marL="68580" indent="0" algn="ctr">
+              <a:buNone/>
+            </a:pPr>
+            <a:r>
+              <a:rPr lang="en-US" sz="3800" dirty="0"/>
+              <a:t>https://github.com/JasonBock/Presentations</a:t>
             </a:r>
           </a:p>
         </p:txBody>
@@ -17656,7 +17671,17 @@
             </a:pPr>
             <a:r>
               <a:rPr lang="en-US" dirty="0"/>
-              <a:t>https://github.com/JasonBock/DynamicProxies</a:t>
+              <a:t>https://github.com/JasonBock/WhatsNewInNETCore3</a:t>
+            </a:r>
+          </a:p>
+          <a:p>
+            <a:pPr marL="285750" indent="-285750">
+              <a:buFont typeface="Arial" panose="020B0604020202020204" pitchFamily="34" charset="0"/>
+              <a:buChar char="•"/>
+            </a:pPr>
+            <a:r>
+              <a:rPr lang="en-US" dirty="0"/>
+              <a:t>https://github.com/JasonBock/Presentations</a:t>
             </a:r>
           </a:p>
           <a:p>
@@ -17776,8 +17801,8 @@
         </p:nvSpPr>
         <p:spPr>
           <a:xfrm>
-            <a:off x="3698697" y="2321960"/>
-            <a:ext cx="8315857" cy="3552510"/>
+            <a:off x="2630184" y="2751513"/>
+            <a:ext cx="9394644" cy="3195262"/>
           </a:xfrm>
           <a:prstGeom prst="rect">
             <a:avLst/>
@@ -18002,7 +18027,22 @@
             </a:pPr>
             <a:r>
               <a:rPr lang="en-US" dirty="0"/>
-              <a:t>https://github.com/JasonBock/DynamicProxies</a:t>
+              <a:t>https://github.com/JasonBock/WhatsNewInNETCore3</a:t>
+            </a:r>
+          </a:p>
+          <a:p>
+            <a:pPr marL="68580" indent="0" algn="ctr">
+              <a:buNone/>
+            </a:pPr>
+            <a:endParaRPr lang="en-US" dirty="0"/>
+          </a:p>
+          <a:p>
+            <a:pPr marL="68580" indent="0" algn="ctr">
+              <a:buNone/>
+            </a:pPr>
+            <a:r>
+              <a:rPr lang="en-US" dirty="0"/>
+              <a:t>https://github.com/JasonBock/Presentations</a:t>
             </a:r>
           </a:p>
         </p:txBody>

</xml_diff>